<commit_message>
added UML to the powerpoint
</commit_message>
<xml_diff>
--- a/Docs/CS225_PPT.pptx
+++ b/Docs/CS225_PPT.pptx
@@ -115,6 +115,58 @@
     </p:ext>
   </p:extLst>
 </p:presentation>
+</file>
+
+<file path=ppt/changesInfos/changesInfo1.xml><?xml version="1.0" encoding="utf-8"?>
+<pc:chgInfo xmlns:a="http://schemas.openxmlformats.org/drawingml/2006/main" xmlns:r="http://schemas.openxmlformats.org/officeDocument/2006/relationships" xmlns:ac="http://schemas.microsoft.com/office/drawing/2013/main/command" xmlns:pc="http://schemas.microsoft.com/office/powerpoint/2013/main/command">
+  <pc:docChgLst>
+    <pc:chgData name="Mark Burrell" userId="44aa68ec2f0e7ca2" providerId="LiveId" clId="{F9B62554-9282-4DE9-9620-A2E1C152C0FF}"/>
+    <pc:docChg chg="undo modSld">
+      <pc:chgData name="Mark Burrell" userId="44aa68ec2f0e7ca2" providerId="LiveId" clId="{F9B62554-9282-4DE9-9620-A2E1C152C0FF}" dt="2018-11-14T03:31:52.742" v="51" actId="20577"/>
+      <pc:docMkLst>
+        <pc:docMk/>
+      </pc:docMkLst>
+      <pc:sldChg chg="addSp delSp modSp">
+        <pc:chgData name="Mark Burrell" userId="44aa68ec2f0e7ca2" providerId="LiveId" clId="{F9B62554-9282-4DE9-9620-A2E1C152C0FF}" dt="2018-11-14T03:31:15.658" v="5" actId="14100"/>
+        <pc:sldMkLst>
+          <pc:docMk/>
+          <pc:sldMk cId="1248976765" sldId="257"/>
+        </pc:sldMkLst>
+        <pc:spChg chg="del">
+          <ac:chgData name="Mark Burrell" userId="44aa68ec2f0e7ca2" providerId="LiveId" clId="{F9B62554-9282-4DE9-9620-A2E1C152C0FF}" dt="2018-11-14T03:30:59.786" v="0" actId="931"/>
+          <ac:spMkLst>
+            <pc:docMk/>
+            <pc:sldMk cId="1248976765" sldId="257"/>
+            <ac:spMk id="3" creationId="{7288BA5E-77A0-4A39-B7BB-514B81E6F31B}"/>
+          </ac:spMkLst>
+        </pc:spChg>
+        <pc:picChg chg="add mod">
+          <ac:chgData name="Mark Burrell" userId="44aa68ec2f0e7ca2" providerId="LiveId" clId="{F9B62554-9282-4DE9-9620-A2E1C152C0FF}" dt="2018-11-14T03:31:15.658" v="5" actId="14100"/>
+          <ac:picMkLst>
+            <pc:docMk/>
+            <pc:sldMk cId="1248976765" sldId="257"/>
+            <ac:picMk id="5" creationId="{13FF3AC4-0387-48E7-BFD3-58EBFC27B6E5}"/>
+          </ac:picMkLst>
+        </pc:picChg>
+      </pc:sldChg>
+      <pc:sldChg chg="modSp">
+        <pc:chgData name="Mark Burrell" userId="44aa68ec2f0e7ca2" providerId="LiveId" clId="{F9B62554-9282-4DE9-9620-A2E1C152C0FF}" dt="2018-11-14T03:31:52.742" v="51" actId="20577"/>
+        <pc:sldMkLst>
+          <pc:docMk/>
+          <pc:sldMk cId="1201692722" sldId="260"/>
+        </pc:sldMkLst>
+        <pc:spChg chg="mod">
+          <ac:chgData name="Mark Burrell" userId="44aa68ec2f0e7ca2" providerId="LiveId" clId="{F9B62554-9282-4DE9-9620-A2E1C152C0FF}" dt="2018-11-14T03:31:52.742" v="51" actId="20577"/>
+          <ac:spMkLst>
+            <pc:docMk/>
+            <pc:sldMk cId="1201692722" sldId="260"/>
+            <ac:spMk id="3" creationId="{3C822BE7-798A-4370-AE42-B351E066243C}"/>
+          </ac:spMkLst>
+        </pc:spChg>
+      </pc:sldChg>
+    </pc:docChg>
+  </pc:docChgLst>
+</pc:chgInfo>
 </file>
 
 <file path=ppt/slideLayouts/slideLayout1.xml><?xml version="1.0" encoding="utf-8"?>
@@ -3445,31 +3497,41 @@
           </a:p>
         </p:txBody>
       </p:sp>
-      <p:sp>
-        <p:nvSpPr>
-          <p:cNvPr id="3" name="Content Placeholder 2">
-            <a:extLst>
-              <a:ext uri="{FF2B5EF4-FFF2-40B4-BE49-F238E27FC236}">
-                <a16:creationId xmlns:a16="http://schemas.microsoft.com/office/drawing/2014/main" id="{7288BA5E-77A0-4A39-B7BB-514B81E6F31B}"/>
-              </a:ext>
-            </a:extLst>
-          </p:cNvPr>
-          <p:cNvSpPr>
-            <a:spLocks noGrp="1"/>
-          </p:cNvSpPr>
+      <p:pic>
+        <p:nvPicPr>
+          <p:cNvPr id="5" name="Content Placeholder 4">
+            <a:extLst>
+              <a:ext uri="{FF2B5EF4-FFF2-40B4-BE49-F238E27FC236}">
+                <a16:creationId xmlns:a16="http://schemas.microsoft.com/office/drawing/2014/main" id="{13FF3AC4-0387-48E7-BFD3-58EBFC27B6E5}"/>
+              </a:ext>
+            </a:extLst>
+          </p:cNvPr>
+          <p:cNvPicPr>
+            <a:picLocks noGrp="1" noChangeAspect="1"/>
+          </p:cNvPicPr>
           <p:nvPr>
             <p:ph idx="1"/>
           </p:nvPr>
-        </p:nvSpPr>
-        <p:spPr/>
-        <p:txBody>
-          <a:bodyPr/>
-          <a:lstStyle/>
-          <a:p>
-            <a:endParaRPr lang="en-US" dirty="0"/>
-          </a:p>
-        </p:txBody>
-      </p:sp>
+        </p:nvPicPr>
+        <p:blipFill>
+          <a:blip r:embed="rId2">
+            <a:extLst>
+              <a:ext uri="{28A0092B-C50C-407E-A947-70E740481C1C}">
+                <a14:useLocalDpi xmlns:a14="http://schemas.microsoft.com/office/drawing/2010/main" val="0"/>
+              </a:ext>
+            </a:extLst>
+          </a:blip>
+          <a:stretch>
+            <a:fillRect/>
+          </a:stretch>
+        </p:blipFill>
+        <p:spPr>
+          <a:xfrm>
+            <a:off x="4023360" y="576120"/>
+            <a:ext cx="4738255" cy="6088403"/>
+          </a:xfrm>
+        </p:spPr>
+      </p:pic>
     </p:spTree>
     <p:extLst>
       <p:ext uri="{BB962C8B-B14F-4D97-AF65-F5344CB8AC3E}">
@@ -3797,9 +3859,23 @@
             </a:r>
           </a:p>
           <a:p>
+            <a:pPr lvl="1"/>
+            <a:r>
+              <a:rPr lang="en-US" dirty="0"/>
+              <a:t>Source-Tree</a:t>
+            </a:r>
+          </a:p>
+          <a:p>
             <a:r>
               <a:rPr lang="en-US" dirty="0"/>
               <a:t>Keep master files up to date</a:t>
+            </a:r>
+          </a:p>
+          <a:p>
+            <a:pPr lvl="1"/>
+            <a:r>
+              <a:rPr lang="en-US" dirty="0"/>
+              <a:t>Version Control</a:t>
             </a:r>
           </a:p>
           <a:p>

</xml_diff>

<commit_message>
updated PPT and Styleguide
</commit_message>
<xml_diff>
--- a/Docs/CS225_PPT.pptx
+++ b/Docs/CS225_PPT.pptx
@@ -121,8 +121,8 @@
 <pc:chgInfo xmlns:a="http://schemas.openxmlformats.org/drawingml/2006/main" xmlns:r="http://schemas.openxmlformats.org/officeDocument/2006/relationships" xmlns:ac="http://schemas.microsoft.com/office/drawing/2013/main/command" xmlns:pc="http://schemas.microsoft.com/office/powerpoint/2013/main/command">
   <pc:docChgLst>
     <pc:chgData name="Mark Burrell" userId="44aa68ec2f0e7ca2" providerId="LiveId" clId="{F9B62554-9282-4DE9-9620-A2E1C152C0FF}"/>
-    <pc:docChg chg="undo modSld">
-      <pc:chgData name="Mark Burrell" userId="44aa68ec2f0e7ca2" providerId="LiveId" clId="{F9B62554-9282-4DE9-9620-A2E1C152C0FF}" dt="2018-11-14T03:31:52.742" v="51" actId="20577"/>
+    <pc:docChg chg="undo custSel modSld">
+      <pc:chgData name="Mark Burrell" userId="44aa68ec2f0e7ca2" providerId="LiveId" clId="{F9B62554-9282-4DE9-9620-A2E1C152C0FF}" dt="2018-11-14T03:35:17.876" v="259" actId="20577"/>
       <pc:docMkLst>
         <pc:docMk/>
       </pc:docMkLst>
@@ -148,6 +148,21 @@
             <ac:picMk id="5" creationId="{13FF3AC4-0387-48E7-BFD3-58EBFC27B6E5}"/>
           </ac:picMkLst>
         </pc:picChg>
+      </pc:sldChg>
+      <pc:sldChg chg="modSp">
+        <pc:chgData name="Mark Burrell" userId="44aa68ec2f0e7ca2" providerId="LiveId" clId="{F9B62554-9282-4DE9-9620-A2E1C152C0FF}" dt="2018-11-14T03:35:17.876" v="259" actId="20577"/>
+        <pc:sldMkLst>
+          <pc:docMk/>
+          <pc:sldMk cId="1228915473" sldId="258"/>
+        </pc:sldMkLst>
+        <pc:spChg chg="mod">
+          <ac:chgData name="Mark Burrell" userId="44aa68ec2f0e7ca2" providerId="LiveId" clId="{F9B62554-9282-4DE9-9620-A2E1C152C0FF}" dt="2018-11-14T03:35:17.876" v="259" actId="20577"/>
+          <ac:spMkLst>
+            <pc:docMk/>
+            <pc:sldMk cId="1228915473" sldId="258"/>
+            <ac:spMk id="3" creationId="{7E27158B-CB13-4A55-8920-F87BC7AB3FC9}"/>
+          </ac:spMkLst>
+        </pc:spChg>
       </pc:sldChg>
       <pc:sldChg chg="modSp">
         <pc:chgData name="Mark Burrell" userId="44aa68ec2f0e7ca2" providerId="LiveId" clId="{F9B62554-9282-4DE9-9620-A2E1C152C0FF}" dt="2018-11-14T03:31:52.742" v="51" actId="20577"/>
@@ -3609,7 +3624,7 @@
         <p:spPr/>
         <p:txBody>
           <a:bodyPr>
-            <a:normAutofit/>
+            <a:normAutofit fontScale="85000" lnSpcReduction="10000"/>
           </a:bodyPr>
           <a:lstStyle/>
           <a:p>
@@ -3658,6 +3673,45 @@
             <a:r>
               <a:rPr lang="en-US" dirty="0"/>
               <a:t>	source files shall contain related classes and subclasses only</a:t>
+            </a:r>
+          </a:p>
+          <a:p>
+            <a:r>
+              <a:rPr lang="en-US" dirty="0"/>
+              <a:t>         Use Eclipse formatting </a:t>
+            </a:r>
+          </a:p>
+          <a:p>
+            <a:pPr lvl="1"/>
+            <a:r>
+              <a:rPr lang="en-US" dirty="0"/>
+              <a:t>Comment headers</a:t>
+            </a:r>
+          </a:p>
+          <a:p>
+            <a:pPr lvl="1"/>
+            <a:r>
+              <a:rPr lang="en-US" dirty="0" err="1"/>
+              <a:t>Ctrl+Shift+F</a:t>
+            </a:r>
+            <a:r>
+              <a:rPr lang="en-US" dirty="0"/>
+              <a:t> all final code</a:t>
+            </a:r>
+          </a:p>
+          <a:p>
+            <a:pPr lvl="1"/>
+            <a:r>
+              <a:rPr lang="en-US" dirty="0"/>
+              <a:t>Use </a:t>
+            </a:r>
+            <a:r>
+              <a:rPr lang="en-US" dirty="0" err="1"/>
+              <a:t>IfDef</a:t>
+            </a:r>
+            <a:r>
+              <a:rPr lang="en-US" dirty="0"/>
+              <a:t>, not pragma</a:t>
             </a:r>
           </a:p>
           <a:p>

</xml_diff>